<commit_message>
Modificaciones en la Presentacion
</commit_message>
<xml_diff>
--- a/Presentacion/WordArt.pptx
+++ b/Presentacion/WordArt.pptx
@@ -2641,18 +2641,18 @@
     </dgm:pt>
   </dgm:ptLst>
   <dgm:cxnLst>
+    <dgm:cxn modelId="{1461BFF0-3CB8-43C4-A126-AB3CE6A823B0}" type="presOf" srcId="{79952E34-0FAF-43A8-8978-EBC85CB8D583}" destId="{1F58C573-FC72-4AE5-8506-0B7299AE6012}" srcOrd="1" destOrd="0" presId="urn:microsoft.com/office/officeart/2005/8/layout/vProcess5"/>
+    <dgm:cxn modelId="{D0B8669A-02E5-4F0F-B0AB-5600DA747C33}" type="presOf" srcId="{5EBE141B-4E7E-47C4-8AF2-4B29A818C8FC}" destId="{841F0706-B8C5-42E9-8F88-52035EE1E186}" srcOrd="0" destOrd="0" presId="urn:microsoft.com/office/officeart/2005/8/layout/vProcess5"/>
+    <dgm:cxn modelId="{E1F97364-2F65-4680-936F-192544C33C7D}" srcId="{4C22E1D2-C341-4F50-A022-77EBEC7986E8}" destId="{414CFC83-701E-4DEC-B02C-7E8A4678ADF0}" srcOrd="1" destOrd="0" parTransId="{040C951C-0D13-4561-9573-0EB9C0D7470B}" sibTransId="{6EA9CD81-A676-42A9-AD25-A30B418A7EC6}"/>
     <dgm:cxn modelId="{88A05FDE-838B-4709-90A1-6C76DA96C6A7}" srcId="{4C22E1D2-C341-4F50-A022-77EBEC7986E8}" destId="{B52DA326-5F15-4096-B8DD-A94FFC01657D}" srcOrd="2" destOrd="0" parTransId="{A27DE297-9E12-453F-B385-781E5E85D467}" sibTransId="{DC7D92DE-1C76-4B5A-8613-AE1E45DC7AAB}"/>
-    <dgm:cxn modelId="{240423CD-2081-4807-99AC-8FE581AC73BF}" type="presOf" srcId="{B52DA326-5F15-4096-B8DD-A94FFC01657D}" destId="{C46D4763-E847-4ADA-B5D6-DD2A7F7F667E}" srcOrd="0" destOrd="0" presId="urn:microsoft.com/office/officeart/2005/8/layout/vProcess5"/>
-    <dgm:cxn modelId="{A36F3405-E7A8-414D-9636-01FB38F6E4C9}" type="presOf" srcId="{414CFC83-701E-4DEC-B02C-7E8A4678ADF0}" destId="{18A10A68-0728-4E4F-BD36-BF9E866731CF}" srcOrd="1" destOrd="0" presId="urn:microsoft.com/office/officeart/2005/8/layout/vProcess5"/>
+    <dgm:cxn modelId="{EFA0E2E9-3ECD-43D8-AF1D-25EC870449E9}" type="presOf" srcId="{B52DA326-5F15-4096-B8DD-A94FFC01657D}" destId="{67430371-9D8E-4DEB-BFDA-DE781F61E25F}" srcOrd="1" destOrd="0" presId="urn:microsoft.com/office/officeart/2005/8/layout/vProcess5"/>
     <dgm:cxn modelId="{4B2C3E0B-0591-4967-AADA-4B908C9F0DAB}" type="presOf" srcId="{6EA9CD81-A676-42A9-AD25-A30B418A7EC6}" destId="{BD86AE2A-B68B-4300-A398-9FBA92F3D0B3}" srcOrd="0" destOrd="0" presId="urn:microsoft.com/office/officeart/2005/8/layout/vProcess5"/>
     <dgm:cxn modelId="{F86AC75F-FB63-455D-9394-ECFBEB5805BC}" type="presOf" srcId="{4C22E1D2-C341-4F50-A022-77EBEC7986E8}" destId="{6EF547B6-797C-4D97-8FC3-56AE7895E169}" srcOrd="0" destOrd="0" presId="urn:microsoft.com/office/officeart/2005/8/layout/vProcess5"/>
+    <dgm:cxn modelId="{5920F7F7-2504-4FD3-82B4-03008FDEFB98}" type="presOf" srcId="{414CFC83-701E-4DEC-B02C-7E8A4678ADF0}" destId="{A81BB9A7-C7DA-4145-9A7D-3A1487F6B9E9}" srcOrd="0" destOrd="0" presId="urn:microsoft.com/office/officeart/2005/8/layout/vProcess5"/>
+    <dgm:cxn modelId="{A36F3405-E7A8-414D-9636-01FB38F6E4C9}" type="presOf" srcId="{414CFC83-701E-4DEC-B02C-7E8A4678ADF0}" destId="{18A10A68-0728-4E4F-BD36-BF9E866731CF}" srcOrd="1" destOrd="0" presId="urn:microsoft.com/office/officeart/2005/8/layout/vProcess5"/>
+    <dgm:cxn modelId="{CDD8906A-4C23-4207-A82E-66B9B96EF752}" type="presOf" srcId="{79952E34-0FAF-43A8-8978-EBC85CB8D583}" destId="{D916572D-4ECD-4ACB-8F4E-1934A400C742}" srcOrd="0" destOrd="0" presId="urn:microsoft.com/office/officeart/2005/8/layout/vProcess5"/>
+    <dgm:cxn modelId="{240423CD-2081-4807-99AC-8FE581AC73BF}" type="presOf" srcId="{B52DA326-5F15-4096-B8DD-A94FFC01657D}" destId="{C46D4763-E847-4ADA-B5D6-DD2A7F7F667E}" srcOrd="0" destOrd="0" presId="urn:microsoft.com/office/officeart/2005/8/layout/vProcess5"/>
     <dgm:cxn modelId="{4C92235C-1E89-4F95-9F2C-922A9835D482}" srcId="{4C22E1D2-C341-4F50-A022-77EBEC7986E8}" destId="{79952E34-0FAF-43A8-8978-EBC85CB8D583}" srcOrd="0" destOrd="0" parTransId="{3ACA2E60-5886-4181-B82A-04788D48FEEF}" sibTransId="{5EBE141B-4E7E-47C4-8AF2-4B29A818C8FC}"/>
-    <dgm:cxn modelId="{CDD8906A-4C23-4207-A82E-66B9B96EF752}" type="presOf" srcId="{79952E34-0FAF-43A8-8978-EBC85CB8D583}" destId="{D916572D-4ECD-4ACB-8F4E-1934A400C742}" srcOrd="0" destOrd="0" presId="urn:microsoft.com/office/officeart/2005/8/layout/vProcess5"/>
-    <dgm:cxn modelId="{E1F97364-2F65-4680-936F-192544C33C7D}" srcId="{4C22E1D2-C341-4F50-A022-77EBEC7986E8}" destId="{414CFC83-701E-4DEC-B02C-7E8A4678ADF0}" srcOrd="1" destOrd="0" parTransId="{040C951C-0D13-4561-9573-0EB9C0D7470B}" sibTransId="{6EA9CD81-A676-42A9-AD25-A30B418A7EC6}"/>
-    <dgm:cxn modelId="{1461BFF0-3CB8-43C4-A126-AB3CE6A823B0}" type="presOf" srcId="{79952E34-0FAF-43A8-8978-EBC85CB8D583}" destId="{1F58C573-FC72-4AE5-8506-0B7299AE6012}" srcOrd="1" destOrd="0" presId="urn:microsoft.com/office/officeart/2005/8/layout/vProcess5"/>
-    <dgm:cxn modelId="{D0B8669A-02E5-4F0F-B0AB-5600DA747C33}" type="presOf" srcId="{5EBE141B-4E7E-47C4-8AF2-4B29A818C8FC}" destId="{841F0706-B8C5-42E9-8F88-52035EE1E186}" srcOrd="0" destOrd="0" presId="urn:microsoft.com/office/officeart/2005/8/layout/vProcess5"/>
-    <dgm:cxn modelId="{EFA0E2E9-3ECD-43D8-AF1D-25EC870449E9}" type="presOf" srcId="{B52DA326-5F15-4096-B8DD-A94FFC01657D}" destId="{67430371-9D8E-4DEB-BFDA-DE781F61E25F}" srcOrd="1" destOrd="0" presId="urn:microsoft.com/office/officeart/2005/8/layout/vProcess5"/>
-    <dgm:cxn modelId="{5920F7F7-2504-4FD3-82B4-03008FDEFB98}" type="presOf" srcId="{414CFC83-701E-4DEC-B02C-7E8A4678ADF0}" destId="{A81BB9A7-C7DA-4145-9A7D-3A1487F6B9E9}" srcOrd="0" destOrd="0" presId="urn:microsoft.com/office/officeart/2005/8/layout/vProcess5"/>
     <dgm:cxn modelId="{512EB060-E089-41A2-BAEA-77ECAFF9E634}" type="presParOf" srcId="{6EF547B6-797C-4D97-8FC3-56AE7895E169}" destId="{9B05EAC1-D099-4A08-A4E0-EADCBC97D0DF}" srcOrd="0" destOrd="0" presId="urn:microsoft.com/office/officeart/2005/8/layout/vProcess5"/>
     <dgm:cxn modelId="{BE75D625-ABAC-46E1-A0D9-C20D0B0C8AA5}" type="presParOf" srcId="{6EF547B6-797C-4D97-8FC3-56AE7895E169}" destId="{D916572D-4ECD-4ACB-8F4E-1934A400C742}" srcOrd="1" destOrd="0" presId="urn:microsoft.com/office/officeart/2005/8/layout/vProcess5"/>
     <dgm:cxn modelId="{428138D4-5446-4F3C-81EB-4938226385E3}" type="presParOf" srcId="{6EF547B6-797C-4D97-8FC3-56AE7895E169}" destId="{A81BB9A7-C7DA-4145-9A7D-3A1487F6B9E9}" srcOrd="2" destOrd="0" presId="urn:microsoft.com/office/officeart/2005/8/layout/vProcess5"/>
@@ -2991,11 +2991,7 @@
         <a:p>
           <a:r>
             <a:rPr lang="es-ES" b="1" dirty="0" smtClean="0"/>
-            <a:t>Global: </a:t>
-          </a:r>
-          <a:r>
-            <a:rPr lang="es-ES" dirty="0" smtClean="0"/>
-            <a:t>que se pueda utilizar en distintos dispositivos y evite la transferencia de archivos.</a:t>
+            <a:t>Global</a:t>
           </a:r>
           <a:endParaRPr lang="es-ES" dirty="0"/>
         </a:p>
@@ -3036,11 +3032,7 @@
         <a:p>
           <a:r>
             <a:rPr lang="es-ES" b="1" dirty="0" smtClean="0"/>
-            <a:t>Flexible: </a:t>
-          </a:r>
-          <a:r>
-            <a:rPr lang="es-ES" dirty="0" smtClean="0"/>
-            <a:t>que permita la inclusión y eliminación de nuevas variables.</a:t>
+            <a:t>Flexible</a:t>
           </a:r>
           <a:endParaRPr lang="es-ES" dirty="0"/>
         </a:p>
@@ -3081,11 +3073,7 @@
         <a:p>
           <a:r>
             <a:rPr lang="es-ES" b="1" dirty="0" smtClean="0"/>
-            <a:t>Fiable: </a:t>
-          </a:r>
-          <a:r>
-            <a:rPr lang="es-ES" dirty="0" smtClean="0"/>
-            <a:t>que otorgue garantía en la planificación de grupos.</a:t>
+            <a:t>Fiable</a:t>
           </a:r>
           <a:endParaRPr lang="es-ES" dirty="0"/>
         </a:p>
@@ -3126,11 +3114,7 @@
         <a:p>
           <a:r>
             <a:rPr lang="es-ES" b="1" dirty="0" smtClean="0"/>
-            <a:t>Funcional: </a:t>
-          </a:r>
-          <a:r>
-            <a:rPr lang="es-ES" dirty="0" smtClean="0"/>
-            <a:t>que evite y detecte la sobrepoblación en el aula.</a:t>
+            <a:t>Funcional</a:t>
           </a:r>
           <a:endParaRPr lang="es-ES" dirty="0"/>
         </a:p>
@@ -4016,8 +4000,8 @@
       </dsp:nvSpPr>
       <dsp:spPr>
         <a:xfrm>
-          <a:off x="4629" y="336250"/>
-          <a:ext cx="2694800" cy="1077920"/>
+          <a:off x="3685" y="0"/>
+          <a:ext cx="2145547" cy="272726"/>
         </a:xfrm>
         <a:prstGeom prst="chevron">
           <a:avLst/>
@@ -4059,12 +4043,12 @@
         </a:fontRef>
       </dsp:style>
       <dsp:txBody>
-        <a:bodyPr spcFirstLastPara="0" vert="horz" wrap="square" lIns="56007" tIns="18669" rIns="18669" bIns="18669" numCol="1" spcCol="1270" anchor="ctr" anchorCtr="0">
+        <a:bodyPr spcFirstLastPara="0" vert="horz" wrap="square" lIns="64008" tIns="21336" rIns="21336" bIns="21336" numCol="1" spcCol="1270" anchor="ctr" anchorCtr="0">
           <a:noAutofit/>
         </a:bodyPr>
         <a:lstStyle/>
         <a:p>
-          <a:pPr lvl="0" algn="ctr" defTabSz="622300">
+          <a:pPr lvl="0" algn="ctr" defTabSz="711200">
             <a:lnSpc>
               <a:spcPct val="90000"/>
             </a:lnSpc>
@@ -4076,19 +4060,15 @@
             </a:spcAft>
           </a:pPr>
           <a:r>
-            <a:rPr lang="es-ES" sz="1400" b="1" kern="1200" dirty="0" smtClean="0"/>
-            <a:t>Global: </a:t>
+            <a:rPr lang="es-ES" sz="1600" b="1" kern="1200" dirty="0" smtClean="0"/>
+            <a:t>Global</a:t>
           </a:r>
-          <a:r>
-            <a:rPr lang="es-ES" sz="1400" kern="1200" dirty="0" smtClean="0"/>
-            <a:t>que se pueda utilizar en distintos dispositivos y evite la transferencia de archivos.</a:t>
-          </a:r>
-          <a:endParaRPr lang="es-ES" sz="1400" kern="1200" dirty="0"/>
+          <a:endParaRPr lang="es-ES" sz="1600" kern="1200" dirty="0"/>
         </a:p>
       </dsp:txBody>
       <dsp:txXfrm>
-        <a:off x="543589" y="336250"/>
-        <a:ext cx="1616880" cy="1077920"/>
+        <a:off x="140048" y="0"/>
+        <a:ext cx="1872821" cy="272726"/>
       </dsp:txXfrm>
     </dsp:sp>
     <dsp:sp modelId="{7BDF4B27-0E00-4C5F-9444-07AD3948C9E2}">
@@ -4098,8 +4078,8 @@
       </dsp:nvSpPr>
       <dsp:spPr>
         <a:xfrm>
-          <a:off x="2429950" y="336250"/>
-          <a:ext cx="2694800" cy="1077920"/>
+          <a:off x="1934678" y="0"/>
+          <a:ext cx="2145547" cy="272726"/>
         </a:xfrm>
         <a:prstGeom prst="chevron">
           <a:avLst/>
@@ -4136,12 +4116,12 @@
         </a:fontRef>
       </dsp:style>
       <dsp:txBody>
-        <a:bodyPr spcFirstLastPara="0" vert="horz" wrap="square" lIns="56007" tIns="18669" rIns="18669" bIns="18669" numCol="1" spcCol="1270" anchor="ctr" anchorCtr="0">
+        <a:bodyPr spcFirstLastPara="0" vert="horz" wrap="square" lIns="64008" tIns="21336" rIns="21336" bIns="21336" numCol="1" spcCol="1270" anchor="ctr" anchorCtr="0">
           <a:noAutofit/>
         </a:bodyPr>
         <a:lstStyle/>
         <a:p>
-          <a:pPr lvl="0" algn="ctr" defTabSz="622300">
+          <a:pPr lvl="0" algn="ctr" defTabSz="711200">
             <a:lnSpc>
               <a:spcPct val="90000"/>
             </a:lnSpc>
@@ -4153,19 +4133,15 @@
             </a:spcAft>
           </a:pPr>
           <a:r>
-            <a:rPr lang="es-ES" sz="1400" b="1" kern="1200" dirty="0" smtClean="0"/>
-            <a:t>Flexible: </a:t>
+            <a:rPr lang="es-ES" sz="1600" b="1" kern="1200" dirty="0" smtClean="0"/>
+            <a:t>Flexible</a:t>
           </a:r>
-          <a:r>
-            <a:rPr lang="es-ES" sz="1400" kern="1200" dirty="0" smtClean="0"/>
-            <a:t>que permita la inclusión y eliminación de nuevas variables.</a:t>
-          </a:r>
-          <a:endParaRPr lang="es-ES" sz="1400" kern="1200" dirty="0"/>
+          <a:endParaRPr lang="es-ES" sz="1600" kern="1200" dirty="0"/>
         </a:p>
       </dsp:txBody>
       <dsp:txXfrm>
-        <a:off x="2968910" y="336250"/>
-        <a:ext cx="1616880" cy="1077920"/>
+        <a:off x="2071041" y="0"/>
+        <a:ext cx="1872821" cy="272726"/>
       </dsp:txXfrm>
     </dsp:sp>
     <dsp:sp modelId="{FD9BAC90-9B47-4484-A99B-88563C7DB6C7}">
@@ -4175,8 +4151,8 @@
       </dsp:nvSpPr>
       <dsp:spPr>
         <a:xfrm>
-          <a:off x="4855270" y="336250"/>
-          <a:ext cx="2694800" cy="1077920"/>
+          <a:off x="3865671" y="0"/>
+          <a:ext cx="2145547" cy="272726"/>
         </a:xfrm>
         <a:prstGeom prst="chevron">
           <a:avLst/>
@@ -4213,12 +4189,12 @@
         </a:fontRef>
       </dsp:style>
       <dsp:txBody>
-        <a:bodyPr spcFirstLastPara="0" vert="horz" wrap="square" lIns="56007" tIns="18669" rIns="18669" bIns="18669" numCol="1" spcCol="1270" anchor="ctr" anchorCtr="0">
+        <a:bodyPr spcFirstLastPara="0" vert="horz" wrap="square" lIns="64008" tIns="21336" rIns="21336" bIns="21336" numCol="1" spcCol="1270" anchor="ctr" anchorCtr="0">
           <a:noAutofit/>
         </a:bodyPr>
         <a:lstStyle/>
         <a:p>
-          <a:pPr lvl="0" algn="ctr" defTabSz="622300">
+          <a:pPr lvl="0" algn="ctr" defTabSz="711200">
             <a:lnSpc>
               <a:spcPct val="90000"/>
             </a:lnSpc>
@@ -4230,19 +4206,15 @@
             </a:spcAft>
           </a:pPr>
           <a:r>
-            <a:rPr lang="es-ES" sz="1400" b="1" kern="1200" dirty="0" smtClean="0"/>
-            <a:t>Fiable: </a:t>
+            <a:rPr lang="es-ES" sz="1600" b="1" kern="1200" dirty="0" smtClean="0"/>
+            <a:t>Fiable</a:t>
           </a:r>
-          <a:r>
-            <a:rPr lang="es-ES" sz="1400" kern="1200" dirty="0" smtClean="0"/>
-            <a:t>que otorgue garantía en la planificación de grupos.</a:t>
-          </a:r>
-          <a:endParaRPr lang="es-ES" sz="1400" kern="1200" dirty="0"/>
+          <a:endParaRPr lang="es-ES" sz="1600" kern="1200" dirty="0"/>
         </a:p>
       </dsp:txBody>
       <dsp:txXfrm>
-        <a:off x="5394230" y="336250"/>
-        <a:ext cx="1616880" cy="1077920"/>
+        <a:off x="4002034" y="0"/>
+        <a:ext cx="1872821" cy="272726"/>
       </dsp:txXfrm>
     </dsp:sp>
     <dsp:sp modelId="{4F2B59C4-64DF-4AF1-A446-BAC01DC34FE1}">
@@ -4252,8 +4224,8 @@
       </dsp:nvSpPr>
       <dsp:spPr>
         <a:xfrm>
-          <a:off x="7280591" y="336250"/>
-          <a:ext cx="2694800" cy="1077920"/>
+          <a:off x="5796664" y="0"/>
+          <a:ext cx="2145547" cy="272726"/>
         </a:xfrm>
         <a:prstGeom prst="chevron">
           <a:avLst/>
@@ -4290,12 +4262,12 @@
         </a:fontRef>
       </dsp:style>
       <dsp:txBody>
-        <a:bodyPr spcFirstLastPara="0" vert="horz" wrap="square" lIns="56007" tIns="18669" rIns="18669" bIns="18669" numCol="1" spcCol="1270" anchor="ctr" anchorCtr="0">
+        <a:bodyPr spcFirstLastPara="0" vert="horz" wrap="square" lIns="64008" tIns="21336" rIns="21336" bIns="21336" numCol="1" spcCol="1270" anchor="ctr" anchorCtr="0">
           <a:noAutofit/>
         </a:bodyPr>
         <a:lstStyle/>
         <a:p>
-          <a:pPr lvl="0" algn="ctr" defTabSz="622300">
+          <a:pPr lvl="0" algn="ctr" defTabSz="711200">
             <a:lnSpc>
               <a:spcPct val="90000"/>
             </a:lnSpc>
@@ -4307,19 +4279,15 @@
             </a:spcAft>
           </a:pPr>
           <a:r>
-            <a:rPr lang="es-ES" sz="1400" b="1" kern="1200" dirty="0" smtClean="0"/>
-            <a:t>Funcional: </a:t>
+            <a:rPr lang="es-ES" sz="1600" b="1" kern="1200" dirty="0" smtClean="0"/>
+            <a:t>Funcional</a:t>
           </a:r>
-          <a:r>
-            <a:rPr lang="es-ES" sz="1400" kern="1200" dirty="0" smtClean="0"/>
-            <a:t>que evite y detecte la sobrepoblación en el aula.</a:t>
-          </a:r>
-          <a:endParaRPr lang="es-ES" sz="1400" kern="1200" dirty="0"/>
+          <a:endParaRPr lang="es-ES" sz="1600" kern="1200" dirty="0"/>
         </a:p>
       </dsp:txBody>
       <dsp:txXfrm>
-        <a:off x="7819551" y="336250"/>
-        <a:ext cx="1616880" cy="1077920"/>
+        <a:off x="5933027" y="0"/>
+        <a:ext cx="1872821" cy="272726"/>
       </dsp:txXfrm>
     </dsp:sp>
   </dsp:spTree>
@@ -9351,7 +9319,7 @@
           <a:p>
             <a:fld id="{0A252739-5827-4614-BA42-2191F88C40FE}" type="datetimeFigureOut">
               <a:rPr lang="es-ES" smtClean="0"/>
-              <a:t>17/06/2019</a:t>
+              <a:t>19/06/2019</a:t>
             </a:fld>
             <a:endParaRPr lang="es-ES"/>
           </a:p>
@@ -9521,7 +9489,7 @@
           <a:p>
             <a:fld id="{0A252739-5827-4614-BA42-2191F88C40FE}" type="datetimeFigureOut">
               <a:rPr lang="es-ES" smtClean="0"/>
-              <a:t>17/06/2019</a:t>
+              <a:t>19/06/2019</a:t>
             </a:fld>
             <a:endParaRPr lang="es-ES"/>
           </a:p>
@@ -9701,7 +9669,7 @@
           <a:p>
             <a:fld id="{0A252739-5827-4614-BA42-2191F88C40FE}" type="datetimeFigureOut">
               <a:rPr lang="es-ES" smtClean="0"/>
-              <a:t>17/06/2019</a:t>
+              <a:t>19/06/2019</a:t>
             </a:fld>
             <a:endParaRPr lang="es-ES"/>
           </a:p>
@@ -9871,7 +9839,7 @@
           <a:p>
             <a:fld id="{0A252739-5827-4614-BA42-2191F88C40FE}" type="datetimeFigureOut">
               <a:rPr lang="es-ES" smtClean="0"/>
-              <a:t>17/06/2019</a:t>
+              <a:t>19/06/2019</a:t>
             </a:fld>
             <a:endParaRPr lang="es-ES"/>
           </a:p>
@@ -10117,7 +10085,7 @@
           <a:p>
             <a:fld id="{0A252739-5827-4614-BA42-2191F88C40FE}" type="datetimeFigureOut">
               <a:rPr lang="es-ES" smtClean="0"/>
-              <a:t>17/06/2019</a:t>
+              <a:t>19/06/2019</a:t>
             </a:fld>
             <a:endParaRPr lang="es-ES"/>
           </a:p>
@@ -10349,7 +10317,7 @@
           <a:p>
             <a:fld id="{0A252739-5827-4614-BA42-2191F88C40FE}" type="datetimeFigureOut">
               <a:rPr lang="es-ES" smtClean="0"/>
-              <a:t>17/06/2019</a:t>
+              <a:t>19/06/2019</a:t>
             </a:fld>
             <a:endParaRPr lang="es-ES"/>
           </a:p>
@@ -10716,7 +10684,7 @@
           <a:p>
             <a:fld id="{0A252739-5827-4614-BA42-2191F88C40FE}" type="datetimeFigureOut">
               <a:rPr lang="es-ES" smtClean="0"/>
-              <a:t>17/06/2019</a:t>
+              <a:t>19/06/2019</a:t>
             </a:fld>
             <a:endParaRPr lang="es-ES"/>
           </a:p>
@@ -10834,7 +10802,7 @@
           <a:p>
             <a:fld id="{0A252739-5827-4614-BA42-2191F88C40FE}" type="datetimeFigureOut">
               <a:rPr lang="es-ES" smtClean="0"/>
-              <a:t>17/06/2019</a:t>
+              <a:t>19/06/2019</a:t>
             </a:fld>
             <a:endParaRPr lang="es-ES"/>
           </a:p>
@@ -10929,7 +10897,7 @@
           <a:p>
             <a:fld id="{0A252739-5827-4614-BA42-2191F88C40FE}" type="datetimeFigureOut">
               <a:rPr lang="es-ES" smtClean="0"/>
-              <a:t>17/06/2019</a:t>
+              <a:t>19/06/2019</a:t>
             </a:fld>
             <a:endParaRPr lang="es-ES"/>
           </a:p>
@@ -11206,7 +11174,7 @@
           <a:p>
             <a:fld id="{0A252739-5827-4614-BA42-2191F88C40FE}" type="datetimeFigureOut">
               <a:rPr lang="es-ES" smtClean="0"/>
-              <a:t>17/06/2019</a:t>
+              <a:t>19/06/2019</a:t>
             </a:fld>
             <a:endParaRPr lang="es-ES"/>
           </a:p>
@@ -11459,7 +11427,7 @@
           <a:p>
             <a:fld id="{0A252739-5827-4614-BA42-2191F88C40FE}" type="datetimeFigureOut">
               <a:rPr lang="es-ES" smtClean="0"/>
-              <a:t>17/06/2019</a:t>
+              <a:t>19/06/2019</a:t>
             </a:fld>
             <a:endParaRPr lang="es-ES"/>
           </a:p>
@@ -11672,7 +11640,7 @@
           <a:p>
             <a:fld id="{0A252739-5827-4614-BA42-2191F88C40FE}" type="datetimeFigureOut">
               <a:rPr lang="es-ES" smtClean="0"/>
-              <a:t>17/06/2019</a:t>
+              <a:t>19/06/2019</a:t>
             </a:fld>
             <a:endParaRPr lang="es-ES"/>
           </a:p>
@@ -12309,6 +12277,9 @@
             <a:chOff x="193277" y="548470"/>
             <a:chExt cx="9347235" cy="665352"/>
           </a:xfrm>
+          <a:solidFill>
+            <a:srgbClr val="8B0000"/>
+          </a:solidFill>
         </p:grpSpPr>
         <p:sp>
           <p:nvSpPr>
@@ -12326,9 +12297,7 @@
                 <a:gd name="adj" fmla="val 10000"/>
               </a:avLst>
             </a:prstGeom>
-            <a:solidFill>
-              <a:srgbClr val="C00000"/>
-            </a:solidFill>
+            <a:grpFill/>
           </p:spPr>
           <p:style>
             <a:lnRef idx="2">
@@ -12369,6 +12338,7 @@
             <a:prstGeom prst="rect">
               <a:avLst/>
             </a:prstGeom>
+            <a:grpFill/>
           </p:spPr>
           <p:style>
             <a:lnRef idx="0">
@@ -12422,11 +12392,14 @@
         </p:nvGrpSpPr>
         <p:grpSpPr>
           <a:xfrm>
-            <a:off x="1163193" y="4162985"/>
+            <a:off x="1163193" y="3343447"/>
             <a:ext cx="9347235" cy="665352"/>
             <a:chOff x="60364" y="1233309"/>
             <a:chExt cx="9347235" cy="665352"/>
           </a:xfrm>
+          <a:solidFill>
+            <a:srgbClr val="8B0000"/>
+          </a:solidFill>
         </p:grpSpPr>
         <p:sp>
           <p:nvSpPr>
@@ -12444,9 +12417,7 @@
                 <a:gd name="adj" fmla="val 10000"/>
               </a:avLst>
             </a:prstGeom>
-            <a:solidFill>
-              <a:srgbClr val="C00000"/>
-            </a:solidFill>
+            <a:grpFill/>
           </p:spPr>
           <p:style>
             <a:lnRef idx="2">
@@ -12487,6 +12458,7 @@
             <a:prstGeom prst="rect">
               <a:avLst/>
             </a:prstGeom>
+            <a:grpFill/>
           </p:spPr>
           <p:style>
             <a:lnRef idx="0">
@@ -12545,9 +12517,9 @@
         <p:grpSpPr>
           <a:xfrm>
             <a:off x="1163194" y="1349830"/>
-            <a:ext cx="9999510" cy="2412274"/>
+            <a:ext cx="9347234" cy="1859589"/>
             <a:chOff x="60364" y="1012797"/>
-            <a:chExt cx="9347235" cy="885864"/>
+            <a:chExt cx="8737507" cy="626378"/>
           </a:xfrm>
         </p:grpSpPr>
         <p:sp>
@@ -12559,7 +12531,7 @@
           <p:spPr>
             <a:xfrm>
               <a:off x="60364" y="1233309"/>
-              <a:ext cx="9347235" cy="665352"/>
+              <a:ext cx="8737507" cy="337806"/>
             </a:xfrm>
             <a:prstGeom prst="roundRect">
               <a:avLst>
@@ -12567,7 +12539,7 @@
               </a:avLst>
             </a:prstGeom>
             <a:solidFill>
-              <a:srgbClr val="C00000"/>
+              <a:srgbClr val="8B0000"/>
             </a:solidFill>
           </p:spPr>
           <p:style>
@@ -12635,7 +12607,6 @@
                 <a:rPr lang="es-ES" sz="1600" dirty="0"/>
                 <a:t>Diseño de un sistema capaz de ayudar en la predicción del número de unidades.</a:t>
               </a:r>
-              <a:endParaRPr lang="es-ES" sz="1600" dirty="0"/>
             </a:p>
           </p:txBody>
         </p:sp>
@@ -12647,14 +12618,14 @@
           <p:nvPr>
             <p:extLst>
               <p:ext uri="{D42A27DB-BD31-4B8C-83A1-F6EECF244321}">
-                <p14:modId xmlns:p14="http://schemas.microsoft.com/office/powerpoint/2010/main" val="2254567150"/>
+                <p14:modId xmlns:p14="http://schemas.microsoft.com/office/powerpoint/2010/main" val="507609679"/>
               </p:ext>
             </p:extLst>
           </p:nvPr>
         </p:nvGraphicFramePr>
         <p:xfrm>
-          <a:off x="1182682" y="2191971"/>
-          <a:ext cx="9980022" cy="1750422"/>
+          <a:off x="1314439" y="2462054"/>
+          <a:ext cx="7945898" cy="272726"/>
         </p:xfrm>
         <a:graphic>
           <a:graphicData uri="http://schemas.openxmlformats.org/drawingml/2006/diagram">
@@ -12700,7 +12671,7 @@
         </p:nvSpPr>
         <p:spPr>
           <a:xfrm>
-            <a:off x="6586765" y="3796701"/>
+            <a:off x="6235446" y="3031175"/>
             <a:ext cx="2708365" cy="369332"/>
           </a:xfrm>
           <a:prstGeom prst="rect">
@@ -12859,7 +12830,7 @@
         </p:nvGrpSpPr>
         <p:grpSpPr>
           <a:xfrm>
-            <a:off x="9225259" y="3669666"/>
+            <a:off x="9223845" y="2722279"/>
             <a:ext cx="740223" cy="752216"/>
             <a:chOff x="8363277" y="1036220"/>
             <a:chExt cx="740223" cy="752216"/>

</xml_diff>